<commit_message>
Update Ryan's Power&Bayes slides
</commit_message>
<xml_diff>
--- a/power-bayesian/ryan_henning/Power and Bayes.pptx
+++ b/power-bayesian/ryan_henning/Power and Bayes.pptx
@@ -5294,7 +5294,7 @@
             </a:pPr>
             <a:r>
               <a:rPr lang="en"/>
-              <a:t>I just matters what question you want to answer.</a:t>
+              <a:t>It just matters what question you want to answer.</a:t>
             </a:r>
           </a:p>
           <a:p>
@@ -14771,7 +14771,7 @@
             <a:tbl>
               <a:tblPr>
                 <a:noFill/>
-                <a:tableStyleId>{33E6FF71-9F4D-4CA3-AB94-9050C7383343}</a:tableStyleId>
+                <a:tableStyleId>{11A4924D-1F28-42C4-9D8D-D39B80C0434D}</a:tableStyleId>
               </a:tblPr>
               <a:tblGrid>
                 <a:gridCol w="2162350"/>

</xml_diff>